<commit_message>
feat: export audit as powerpoint deck
</commit_message>
<xml_diff>
--- a/backend/core/templates/core/audit_report_template_en.pptx
+++ b/backend/core/templates/core/audit_report_template_en.pptx
@@ -6,6 +6,9 @@
   </p:sldMasterIdLst>
   <p:sldIdLst>
     <p:sldId id="256" r:id="rId2"/>
+    <p:sldId id="257" r:id="rId3"/>
+    <p:sldId id="258" r:id="rId4"/>
+    <p:sldId id="259" r:id="rId5"/>
   </p:sldIdLst>
   <p:sldSz cx="12192000" cy="6858000"/>
   <p:notesSz cx="6858000" cy="9144000"/>
@@ -104,6 +107,11 @@
       </a:defRPr>
     </a:lvl9pPr>
   </p:defaultTextStyle>
+  <p:extLst>
+    <p:ext uri="{EFAFB233-063F-42B5-8137-9DF3F51BA10A}">
+      <p15:sldGuideLst xmlns:p15="http://schemas.microsoft.com/office/powerpoint/2012/main"/>
+    </p:ext>
+  </p:extLst>
 </p:presentation>
 </file>
 
@@ -256,7 +264,7 @@
           <a:p>
             <a:fld id="{7CD783A5-BC47-ED4D-84DA-4F8B01B4E4C0}" type="datetimeFigureOut">
               <a:rPr lang="en-FR" smtClean="0"/>
-              <a:t>23/10/2025</a:t>
+              <a:t>05/01/2026</a:t>
             </a:fld>
             <a:endParaRPr lang="en-FR"/>
           </a:p>
@@ -456,7 +464,7 @@
           <a:p>
             <a:fld id="{7CD783A5-BC47-ED4D-84DA-4F8B01B4E4C0}" type="datetimeFigureOut">
               <a:rPr lang="en-FR" smtClean="0"/>
-              <a:t>23/10/2025</a:t>
+              <a:t>05/01/2026</a:t>
             </a:fld>
             <a:endParaRPr lang="en-FR"/>
           </a:p>
@@ -666,7 +674,7 @@
           <a:p>
             <a:fld id="{7CD783A5-BC47-ED4D-84DA-4F8B01B4E4C0}" type="datetimeFigureOut">
               <a:rPr lang="en-FR" smtClean="0"/>
-              <a:t>23/10/2025</a:t>
+              <a:t>05/01/2026</a:t>
             </a:fld>
             <a:endParaRPr lang="en-FR"/>
           </a:p>
@@ -740,7 +748,7 @@
 </file>
 
 <file path=ppt/slideLayouts/slideLayout2.xml><?xml version="1.0" encoding="utf-8"?>
-<p:sldLayout xmlns:a="http://schemas.openxmlformats.org/drawingml/2006/main" xmlns:r="http://schemas.openxmlformats.org/officeDocument/2006/relationships" xmlns:p="http://schemas.openxmlformats.org/presentationml/2006/main" type="obj" preserve="1">
+<p:sldLayout xmlns:a="http://schemas.openxmlformats.org/drawingml/2006/main" xmlns:r="http://schemas.openxmlformats.org/officeDocument/2006/relationships" xmlns:p="http://schemas.openxmlformats.org/presentationml/2006/main" preserve="1" userDrawn="1">
   <p:cSld name="Title and Content">
     <p:spTree>
       <p:nvGrpSpPr>
@@ -866,7 +874,7 @@
           <a:p>
             <a:fld id="{7CD783A5-BC47-ED4D-84DA-4F8B01B4E4C0}" type="datetimeFigureOut">
               <a:rPr lang="en-FR" smtClean="0"/>
-              <a:t>23/10/2025</a:t>
+              <a:t>05/01/2026</a:t>
             </a:fld>
             <a:endParaRPr lang="en-FR"/>
           </a:p>
@@ -1142,7 +1150,7 @@
           <a:p>
             <a:fld id="{7CD783A5-BC47-ED4D-84DA-4F8B01B4E4C0}" type="datetimeFigureOut">
               <a:rPr lang="en-FR" smtClean="0"/>
-              <a:t>23/10/2025</a:t>
+              <a:t>05/01/2026</a:t>
             </a:fld>
             <a:endParaRPr lang="en-FR"/>
           </a:p>
@@ -1410,7 +1418,7 @@
           <a:p>
             <a:fld id="{7CD783A5-BC47-ED4D-84DA-4F8B01B4E4C0}" type="datetimeFigureOut">
               <a:rPr lang="en-FR" smtClean="0"/>
-              <a:t>23/10/2025</a:t>
+              <a:t>05/01/2026</a:t>
             </a:fld>
             <a:endParaRPr lang="en-FR"/>
           </a:p>
@@ -1825,7 +1833,7 @@
           <a:p>
             <a:fld id="{7CD783A5-BC47-ED4D-84DA-4F8B01B4E4C0}" type="datetimeFigureOut">
               <a:rPr lang="en-FR" smtClean="0"/>
-              <a:t>23/10/2025</a:t>
+              <a:t>05/01/2026</a:t>
             </a:fld>
             <a:endParaRPr lang="en-FR"/>
           </a:p>
@@ -1967,7 +1975,7 @@
           <a:p>
             <a:fld id="{7CD783A5-BC47-ED4D-84DA-4F8B01B4E4C0}" type="datetimeFigureOut">
               <a:rPr lang="en-FR" smtClean="0"/>
-              <a:t>23/10/2025</a:t>
+              <a:t>05/01/2026</a:t>
             </a:fld>
             <a:endParaRPr lang="en-FR"/>
           </a:p>
@@ -2080,7 +2088,7 @@
           <a:p>
             <a:fld id="{7CD783A5-BC47-ED4D-84DA-4F8B01B4E4C0}" type="datetimeFigureOut">
               <a:rPr lang="en-FR" smtClean="0"/>
-              <a:t>23/10/2025</a:t>
+              <a:t>05/01/2026</a:t>
             </a:fld>
             <a:endParaRPr lang="en-FR"/>
           </a:p>
@@ -2393,7 +2401,7 @@
           <a:p>
             <a:fld id="{7CD783A5-BC47-ED4D-84DA-4F8B01B4E4C0}" type="datetimeFigureOut">
               <a:rPr lang="en-FR" smtClean="0"/>
-              <a:t>23/10/2025</a:t>
+              <a:t>05/01/2026</a:t>
             </a:fld>
             <a:endParaRPr lang="en-FR"/>
           </a:p>
@@ -2682,7 +2690,7 @@
           <a:p>
             <a:fld id="{7CD783A5-BC47-ED4D-84DA-4F8B01B4E4C0}" type="datetimeFigureOut">
               <a:rPr lang="en-FR" smtClean="0"/>
-              <a:t>23/10/2025</a:t>
+              <a:t>05/01/2026</a:t>
             </a:fld>
             <a:endParaRPr lang="en-FR"/>
           </a:p>
@@ -2925,7 +2933,7 @@
           <a:p>
             <a:fld id="{7CD783A5-BC47-ED4D-84DA-4F8B01B4E4C0}" type="datetimeFigureOut">
               <a:rPr lang="en-FR" smtClean="0"/>
-              <a:t>23/10/2025</a:t>
+              <a:t>05/01/2026</a:t>
             </a:fld>
             <a:endParaRPr lang="en-FR"/>
           </a:p>
@@ -3364,40 +3372,65 @@
           <a:lstStyle/>
           <a:p>
             <a:r>
+              <a:rPr lang="en-US" dirty="0"/>
+              <a:t>{{</a:t>
+            </a:r>
+            <a:r>
+              <a:rPr lang="en-US" dirty="0" err="1"/>
+              <a:t>audit_name</a:t>
+            </a:r>
+            <a:r>
+              <a:rPr lang="en-US" dirty="0"/>
+              <a:t>}}</a:t>
+            </a:r>
+            <a:br>
+              <a:rPr lang="en-US" dirty="0"/>
+            </a:br>
+            <a:endParaRPr lang="en-FR" dirty="0"/>
+          </a:p>
+        </p:txBody>
+      </p:sp>
+      <p:sp>
+        <p:nvSpPr>
+          <p:cNvPr id="3" name="Subtitle 2">
+            <a:extLst>
+              <a:ext uri="{FF2B5EF4-FFF2-40B4-BE49-F238E27FC236}">
+                <a16:creationId xmlns:a16="http://schemas.microsoft.com/office/drawing/2014/main" id="{F67D5A75-94B3-B72E-B925-A1ABAE11BC30}"/>
+              </a:ext>
+            </a:extLst>
+          </p:cNvPr>
+          <p:cNvSpPr>
+            <a:spLocks noGrp="1"/>
+          </p:cNvSpPr>
+          <p:nvPr>
+            <p:ph type="subTitle" idx="1"/>
+          </p:nvPr>
+        </p:nvSpPr>
+        <p:spPr/>
+        <p:txBody>
+          <a:bodyPr/>
+          <a:lstStyle/>
+          <a:p>
+            <a:r>
+              <a:rPr lang="en-FR" dirty="0"/>
+              <a:t>CISO Assistant – audit report</a:t>
+            </a:r>
+          </a:p>
+          <a:p>
+            <a:endParaRPr lang="en-FR" dirty="0"/>
+          </a:p>
+          <a:p>
+            <a:r>
               <a:rPr lang="en-GB" dirty="0"/>
-              <a:t>M</a:t>
-            </a:r>
-            <a:r>
-              <a:rPr lang="en-FR" dirty="0"/>
-              <a:t>y presentation</a:t>
-            </a:r>
-          </a:p>
-        </p:txBody>
-      </p:sp>
-      <p:sp>
-        <p:nvSpPr>
-          <p:cNvPr id="3" name="Subtitle 2">
-            <a:extLst>
-              <a:ext uri="{FF2B5EF4-FFF2-40B4-BE49-F238E27FC236}">
-                <a16:creationId xmlns:a16="http://schemas.microsoft.com/office/drawing/2014/main" id="{F67D5A75-94B3-B72E-B925-A1ABAE11BC30}"/>
-              </a:ext>
-            </a:extLst>
-          </p:cNvPr>
-          <p:cNvSpPr>
-            <a:spLocks noGrp="1"/>
-          </p:cNvSpPr>
-          <p:nvPr>
-            <p:ph type="subTitle" idx="1"/>
-          </p:nvPr>
-        </p:nvSpPr>
-        <p:spPr/>
-        <p:txBody>
-          <a:bodyPr/>
-          <a:lstStyle/>
-          <a:p>
-            <a:r>
-              <a:rPr lang="en-FR" dirty="0"/>
-              <a:t>{{ here }}</a:t>
+              <a:t>{{</a:t>
+            </a:r>
+            <a:r>
+              <a:rPr lang="en-GB" dirty="0" err="1"/>
+              <a:t>framework_name</a:t>
+            </a:r>
+            <a:r>
+              <a:rPr lang="en-GB" dirty="0"/>
+              <a:t>}}</a:t>
             </a:r>
           </a:p>
         </p:txBody>
@@ -3406,6 +3439,331 @@
     <p:extLst>
       <p:ext uri="{BB962C8B-B14F-4D97-AF65-F5344CB8AC3E}">
         <p14:creationId xmlns:p14="http://schemas.microsoft.com/office/powerpoint/2010/main" val="2227980164"/>
+      </p:ext>
+    </p:extLst>
+  </p:cSld>
+  <p:clrMapOvr>
+    <a:masterClrMapping/>
+  </p:clrMapOvr>
+</p:sld>
+</file>
+
+<file path=ppt/slides/slide2.xml><?xml version="1.0" encoding="utf-8"?>
+<p:sld xmlns:a="http://schemas.openxmlformats.org/drawingml/2006/main" xmlns:r="http://schemas.openxmlformats.org/officeDocument/2006/relationships" xmlns:p="http://schemas.openxmlformats.org/presentationml/2006/main">
+  <p:cSld>
+    <p:spTree>
+      <p:nvGrpSpPr>
+        <p:cNvPr id="1" name=""/>
+        <p:cNvGrpSpPr/>
+        <p:nvPr/>
+      </p:nvGrpSpPr>
+      <p:grpSpPr>
+        <a:xfrm>
+          <a:off x="0" y="0"/>
+          <a:ext cx="0" cy="0"/>
+          <a:chOff x="0" y="0"/>
+          <a:chExt cx="0" cy="0"/>
+        </a:xfrm>
+      </p:grpSpPr>
+      <p:sp>
+        <p:nvSpPr>
+          <p:cNvPr id="2" name="Title 1">
+            <a:extLst>
+              <a:ext uri="{FF2B5EF4-FFF2-40B4-BE49-F238E27FC236}">
+                <a16:creationId xmlns:a16="http://schemas.microsoft.com/office/drawing/2014/main" id="{25F2C3F3-AE9B-80B9-5DF6-0DC44453D321}"/>
+              </a:ext>
+            </a:extLst>
+          </p:cNvPr>
+          <p:cNvSpPr>
+            <a:spLocks noGrp="1"/>
+          </p:cNvSpPr>
+          <p:nvPr>
+            <p:ph type="title"/>
+          </p:nvPr>
+        </p:nvSpPr>
+        <p:spPr/>
+        <p:txBody>
+          <a:bodyPr/>
+          <a:lstStyle/>
+          <a:p>
+            <a:r>
+              <a:rPr lang="en-FR" dirty="0"/>
+              <a:t>Compliance overview</a:t>
+            </a:r>
+          </a:p>
+        </p:txBody>
+      </p:sp>
+      <p:sp>
+        <p:nvSpPr>
+          <p:cNvPr id="8" name="Rectangle 7">
+            <a:extLst>
+              <a:ext uri="{FF2B5EF4-FFF2-40B4-BE49-F238E27FC236}">
+                <a16:creationId xmlns:a16="http://schemas.microsoft.com/office/drawing/2014/main" id="{B0BE4B8C-4514-D35C-1363-F69A5A687542}"/>
+              </a:ext>
+            </a:extLst>
+          </p:cNvPr>
+          <p:cNvSpPr/>
+          <p:nvPr/>
+        </p:nvSpPr>
+        <p:spPr>
+          <a:xfrm>
+            <a:off x="3535997" y="2582920"/>
+            <a:ext cx="5399405" cy="3239770"/>
+          </a:xfrm>
+          <a:prstGeom prst="rect">
+            <a:avLst/>
+          </a:prstGeom>
+        </p:spPr>
+        <p:style>
+          <a:lnRef idx="2">
+            <a:schemeClr val="accent1">
+              <a:shade val="15000"/>
+            </a:schemeClr>
+          </a:lnRef>
+          <a:fillRef idx="1">
+            <a:schemeClr val="accent1"/>
+          </a:fillRef>
+          <a:effectRef idx="0">
+            <a:schemeClr val="accent1"/>
+          </a:effectRef>
+          <a:fontRef idx="minor">
+            <a:schemeClr val="lt1"/>
+          </a:fontRef>
+        </p:style>
+        <p:txBody>
+          <a:bodyPr rtlCol="0" anchor="ctr"/>
+          <a:lstStyle/>
+          <a:p>
+            <a:pPr algn="ctr"/>
+            <a:r>
+              <a:rPr lang="en-GB" dirty="0"/>
+              <a:t>{{</a:t>
+            </a:r>
+            <a:r>
+              <a:rPr lang="en-GB" dirty="0" err="1"/>
+              <a:t>compliance_donut</a:t>
+            </a:r>
+            <a:r>
+              <a:rPr lang="en-GB" dirty="0"/>
+              <a:t>}}</a:t>
+            </a:r>
+            <a:endParaRPr lang="en-FR" dirty="0"/>
+          </a:p>
+        </p:txBody>
+      </p:sp>
+    </p:spTree>
+    <p:extLst>
+      <p:ext uri="{BB962C8B-B14F-4D97-AF65-F5344CB8AC3E}">
+        <p14:creationId xmlns:p14="http://schemas.microsoft.com/office/powerpoint/2010/main" val="3953274088"/>
+      </p:ext>
+    </p:extLst>
+  </p:cSld>
+  <p:clrMapOvr>
+    <a:masterClrMapping/>
+  </p:clrMapOvr>
+</p:sld>
+</file>
+
+<file path=ppt/slides/slide3.xml><?xml version="1.0" encoding="utf-8"?>
+<p:sld xmlns:a="http://schemas.openxmlformats.org/drawingml/2006/main" xmlns:r="http://schemas.openxmlformats.org/officeDocument/2006/relationships" xmlns:p="http://schemas.openxmlformats.org/presentationml/2006/main">
+  <p:cSld>
+    <p:spTree>
+      <p:nvGrpSpPr>
+        <p:cNvPr id="1" name=""/>
+        <p:cNvGrpSpPr/>
+        <p:nvPr/>
+      </p:nvGrpSpPr>
+      <p:grpSpPr>
+        <a:xfrm>
+          <a:off x="0" y="0"/>
+          <a:ext cx="0" cy="0"/>
+          <a:chOff x="0" y="0"/>
+          <a:chExt cx="0" cy="0"/>
+        </a:xfrm>
+      </p:grpSpPr>
+      <p:sp>
+        <p:nvSpPr>
+          <p:cNvPr id="2" name="Title 1">
+            <a:extLst>
+              <a:ext uri="{FF2B5EF4-FFF2-40B4-BE49-F238E27FC236}">
+                <a16:creationId xmlns:a16="http://schemas.microsoft.com/office/drawing/2014/main" id="{3FF955CE-8BD2-7DD6-59A6-0C63AB649903}"/>
+              </a:ext>
+            </a:extLst>
+          </p:cNvPr>
+          <p:cNvSpPr>
+            <a:spLocks noGrp="1"/>
+          </p:cNvSpPr>
+          <p:nvPr>
+            <p:ph type="title"/>
+          </p:nvPr>
+        </p:nvSpPr>
+        <p:spPr/>
+        <p:txBody>
+          <a:bodyPr/>
+          <a:lstStyle/>
+          <a:p>
+            <a:r>
+              <a:rPr lang="en-FR" dirty="0"/>
+              <a:t>Controls breakdown</a:t>
+            </a:r>
+          </a:p>
+        </p:txBody>
+      </p:sp>
+      <p:sp>
+        <p:nvSpPr>
+          <p:cNvPr id="5" name="Rectangle 4">
+            <a:extLst>
+              <a:ext uri="{FF2B5EF4-FFF2-40B4-BE49-F238E27FC236}">
+                <a16:creationId xmlns:a16="http://schemas.microsoft.com/office/drawing/2014/main" id="{6F52AE81-2B76-70F5-2E6F-D5D477BEAD9B}"/>
+              </a:ext>
+            </a:extLst>
+          </p:cNvPr>
+          <p:cNvSpPr/>
+          <p:nvPr/>
+        </p:nvSpPr>
+        <p:spPr>
+          <a:xfrm>
+            <a:off x="3778664" y="2369203"/>
+            <a:ext cx="5399405" cy="3239770"/>
+          </a:xfrm>
+          <a:prstGeom prst="rect">
+            <a:avLst/>
+          </a:prstGeom>
+        </p:spPr>
+        <p:style>
+          <a:lnRef idx="2">
+            <a:schemeClr val="accent1">
+              <a:shade val="15000"/>
+            </a:schemeClr>
+          </a:lnRef>
+          <a:fillRef idx="1">
+            <a:schemeClr val="accent1"/>
+          </a:fillRef>
+          <a:effectRef idx="0">
+            <a:schemeClr val="accent1"/>
+          </a:effectRef>
+          <a:fontRef idx="minor">
+            <a:schemeClr val="lt1"/>
+          </a:fontRef>
+        </p:style>
+        <p:txBody>
+          <a:bodyPr rtlCol="0" anchor="ctr"/>
+          <a:lstStyle/>
+          <a:p>
+            <a:pPr algn="ctr"/>
+            <a:r>
+              <a:rPr lang="en-FR" dirty="0"/>
+              <a:t>{{chart_controls}}</a:t>
+            </a:r>
+          </a:p>
+        </p:txBody>
+      </p:sp>
+    </p:spTree>
+    <p:extLst>
+      <p:ext uri="{BB962C8B-B14F-4D97-AF65-F5344CB8AC3E}">
+        <p14:creationId xmlns:p14="http://schemas.microsoft.com/office/powerpoint/2010/main" val="121933325"/>
+      </p:ext>
+    </p:extLst>
+  </p:cSld>
+  <p:clrMapOvr>
+    <a:masterClrMapping/>
+  </p:clrMapOvr>
+</p:sld>
+</file>
+
+<file path=ppt/slides/slide4.xml><?xml version="1.0" encoding="utf-8"?>
+<p:sld xmlns:a="http://schemas.openxmlformats.org/drawingml/2006/main" xmlns:r="http://schemas.openxmlformats.org/officeDocument/2006/relationships" xmlns:p="http://schemas.openxmlformats.org/presentationml/2006/main">
+  <p:cSld>
+    <p:spTree>
+      <p:nvGrpSpPr>
+        <p:cNvPr id="1" name=""/>
+        <p:cNvGrpSpPr/>
+        <p:nvPr/>
+      </p:nvGrpSpPr>
+      <p:grpSpPr>
+        <a:xfrm>
+          <a:off x="0" y="0"/>
+          <a:ext cx="0" cy="0"/>
+          <a:chOff x="0" y="0"/>
+          <a:chExt cx="0" cy="0"/>
+        </a:xfrm>
+      </p:grpSpPr>
+      <p:sp>
+        <p:nvSpPr>
+          <p:cNvPr id="2" name="Title 1">
+            <a:extLst>
+              <a:ext uri="{FF2B5EF4-FFF2-40B4-BE49-F238E27FC236}">
+                <a16:creationId xmlns:a16="http://schemas.microsoft.com/office/drawing/2014/main" id="{FFF777E3-CD97-C5A0-4E84-AE49469FB37D}"/>
+              </a:ext>
+            </a:extLst>
+          </p:cNvPr>
+          <p:cNvSpPr>
+            <a:spLocks noGrp="1"/>
+          </p:cNvSpPr>
+          <p:nvPr>
+            <p:ph type="title"/>
+          </p:nvPr>
+        </p:nvSpPr>
+        <p:spPr/>
+        <p:txBody>
+          <a:bodyPr/>
+          <a:lstStyle/>
+          <a:p>
+            <a:r>
+              <a:rPr lang="en-GB" dirty="0"/>
+              <a:t>A</a:t>
+            </a:r>
+            <a:r>
+              <a:rPr lang="en-FR" dirty="0"/>
+              <a:t>ll controls</a:t>
+            </a:r>
+          </a:p>
+        </p:txBody>
+      </p:sp>
+      <p:sp>
+        <p:nvSpPr>
+          <p:cNvPr id="3" name="Content Placeholder 2">
+            <a:extLst>
+              <a:ext uri="{FF2B5EF4-FFF2-40B4-BE49-F238E27FC236}">
+                <a16:creationId xmlns:a16="http://schemas.microsoft.com/office/drawing/2014/main" id="{BEC9753F-2F0C-F265-190A-E291557E3F84}"/>
+              </a:ext>
+            </a:extLst>
+          </p:cNvPr>
+          <p:cNvSpPr>
+            <a:spLocks noGrp="1"/>
+          </p:cNvSpPr>
+          <p:nvPr>
+            <p:ph idx="1"/>
+          </p:nvPr>
+        </p:nvSpPr>
+        <p:spPr/>
+        <p:txBody>
+          <a:bodyPr/>
+          <a:lstStyle/>
+          <a:p>
+            <a:pPr marL="0" indent="0">
+              <a:buNone/>
+            </a:pPr>
+            <a:r>
+              <a:rPr lang="en-GB" dirty="0"/>
+              <a:t>{{</a:t>
+            </a:r>
+            <a:r>
+              <a:rPr lang="en-GB" dirty="0" err="1"/>
+              <a:t>table_full_controls</a:t>
+            </a:r>
+            <a:r>
+              <a:rPr lang="en-GB" dirty="0"/>
+              <a:t>}}</a:t>
+            </a:r>
+            <a:endParaRPr lang="en-FR" dirty="0"/>
+          </a:p>
+        </p:txBody>
+      </p:sp>
+    </p:spTree>
+    <p:extLst>
+      <p:ext uri="{BB962C8B-B14F-4D97-AF65-F5344CB8AC3E}">
+        <p14:creationId xmlns:p14="http://schemas.microsoft.com/office/powerpoint/2010/main" val="2873116916"/>
       </p:ext>
     </p:extLst>
   </p:cSld>

</xml_diff>

<commit_message>
wip and fix donut issues
</commit_message>
<xml_diff>
--- a/backend/core/templates/core/audit_report_template_en.pptx
+++ b/backend/core/templates/core/audit_report_template_en.pptx
@@ -1,14 +1,18 @@
 
 <file path=ppt/presentation.xml><?xml version="1.0" encoding="utf-8"?>
-<p:presentation xmlns:a="http://schemas.openxmlformats.org/drawingml/2006/main" xmlns:r="http://schemas.openxmlformats.org/officeDocument/2006/relationships" xmlns:p="http://schemas.openxmlformats.org/presentationml/2006/main" saveSubsetFonts="1" autoCompressPictures="0">
+<p:presentation xmlns:a="http://schemas.openxmlformats.org/drawingml/2006/main" xmlns:r="http://schemas.openxmlformats.org/officeDocument/2006/relationships" xmlns:p="http://schemas.openxmlformats.org/presentationml/2006/main" showSpecialPlsOnTitleSld="0" saveSubsetFonts="1" autoCompressPictures="0">
   <p:sldMasterIdLst>
     <p:sldMasterId id="2147483648" r:id="rId1"/>
   </p:sldMasterIdLst>
+  <p:notesMasterIdLst>
+    <p:notesMasterId r:id="rId7"/>
+  </p:notesMasterIdLst>
   <p:sldIdLst>
     <p:sldId id="256" r:id="rId2"/>
-    <p:sldId id="257" r:id="rId3"/>
-    <p:sldId id="258" r:id="rId4"/>
-    <p:sldId id="259" r:id="rId5"/>
+    <p:sldId id="260" r:id="rId3"/>
+    <p:sldId id="257" r:id="rId4"/>
+    <p:sldId id="258" r:id="rId5"/>
+    <p:sldId id="259" r:id="rId6"/>
   </p:sldIdLst>
   <p:sldSz cx="12192000" cy="6858000"/>
   <p:notesSz cx="6858000" cy="9144000"/>
@@ -115,6 +119,356 @@
 </p:presentation>
 </file>
 
+<file path=ppt/notesMasters/notesMaster1.xml><?xml version="1.0" encoding="utf-8"?>
+<p:notesMaster xmlns:a="http://schemas.openxmlformats.org/drawingml/2006/main" xmlns:r="http://schemas.openxmlformats.org/officeDocument/2006/relationships" xmlns:p="http://schemas.openxmlformats.org/presentationml/2006/main">
+  <p:cSld>
+    <p:bg>
+      <p:bgRef idx="1001">
+        <a:schemeClr val="bg1"/>
+      </p:bgRef>
+    </p:bg>
+    <p:spTree>
+      <p:nvGrpSpPr>
+        <p:cNvPr id="1" name=""/>
+        <p:cNvGrpSpPr/>
+        <p:nvPr/>
+      </p:nvGrpSpPr>
+      <p:grpSpPr>
+        <a:xfrm>
+          <a:off x="0" y="0"/>
+          <a:ext cx="0" cy="0"/>
+          <a:chOff x="0" y="0"/>
+          <a:chExt cx="0" cy="0"/>
+        </a:xfrm>
+      </p:grpSpPr>
+      <p:sp>
+        <p:nvSpPr>
+          <p:cNvPr id="2" name="Header Placeholder 1"/>
+          <p:cNvSpPr>
+            <a:spLocks noGrp="1"/>
+          </p:cNvSpPr>
+          <p:nvPr>
+            <p:ph type="hdr" sz="quarter"/>
+          </p:nvPr>
+        </p:nvSpPr>
+        <p:spPr>
+          <a:xfrm>
+            <a:off x="0" y="0"/>
+            <a:ext cx="2971800" cy="458788"/>
+          </a:xfrm>
+          <a:prstGeom prst="rect">
+            <a:avLst/>
+          </a:prstGeom>
+        </p:spPr>
+        <p:txBody>
+          <a:bodyPr vert="horz" lIns="91440" tIns="45720" rIns="91440" bIns="45720" rtlCol="0"/>
+          <a:lstStyle>
+            <a:lvl1pPr algn="l">
+              <a:defRPr sz="1200"/>
+            </a:lvl1pPr>
+          </a:lstStyle>
+          <a:p>
+            <a:endParaRPr lang="en-FR"/>
+          </a:p>
+        </p:txBody>
+      </p:sp>
+      <p:sp>
+        <p:nvSpPr>
+          <p:cNvPr id="3" name="Date Placeholder 2"/>
+          <p:cNvSpPr>
+            <a:spLocks noGrp="1"/>
+          </p:cNvSpPr>
+          <p:nvPr>
+            <p:ph type="dt" idx="1"/>
+          </p:nvPr>
+        </p:nvSpPr>
+        <p:spPr>
+          <a:xfrm>
+            <a:off x="3884613" y="0"/>
+            <a:ext cx="2971800" cy="458788"/>
+          </a:xfrm>
+          <a:prstGeom prst="rect">
+            <a:avLst/>
+          </a:prstGeom>
+        </p:spPr>
+        <p:txBody>
+          <a:bodyPr vert="horz" lIns="91440" tIns="45720" rIns="91440" bIns="45720" rtlCol="0"/>
+          <a:lstStyle>
+            <a:lvl1pPr algn="r">
+              <a:defRPr sz="1200"/>
+            </a:lvl1pPr>
+          </a:lstStyle>
+          <a:p>
+            <a:fld id="{A7FAE7A7-2902-574B-A71C-EC27DC0C2C2E}" type="datetimeFigureOut">
+              <a:rPr lang="en-FR" smtClean="0"/>
+              <a:t>06/01/2026</a:t>
+            </a:fld>
+            <a:endParaRPr lang="en-FR"/>
+          </a:p>
+        </p:txBody>
+      </p:sp>
+      <p:sp>
+        <p:nvSpPr>
+          <p:cNvPr id="4" name="Slide Image Placeholder 3"/>
+          <p:cNvSpPr>
+            <a:spLocks noGrp="1" noRot="1" noChangeAspect="1"/>
+          </p:cNvSpPr>
+          <p:nvPr>
+            <p:ph type="sldImg" idx="2"/>
+          </p:nvPr>
+        </p:nvSpPr>
+        <p:spPr>
+          <a:xfrm>
+            <a:off x="685800" y="1143000"/>
+            <a:ext cx="5486400" cy="3086100"/>
+          </a:xfrm>
+          <a:prstGeom prst="rect">
+            <a:avLst/>
+          </a:prstGeom>
+          <a:noFill/>
+          <a:ln w="12700">
+            <a:solidFill>
+              <a:prstClr val="black"/>
+            </a:solidFill>
+          </a:ln>
+        </p:spPr>
+        <p:txBody>
+          <a:bodyPr vert="horz" lIns="91440" tIns="45720" rIns="91440" bIns="45720" rtlCol="0" anchor="ctr"/>
+          <a:lstStyle/>
+          <a:p>
+            <a:endParaRPr lang="en-FR"/>
+          </a:p>
+        </p:txBody>
+      </p:sp>
+      <p:sp>
+        <p:nvSpPr>
+          <p:cNvPr id="5" name="Notes Placeholder 4"/>
+          <p:cNvSpPr>
+            <a:spLocks noGrp="1"/>
+          </p:cNvSpPr>
+          <p:nvPr>
+            <p:ph type="body" sz="quarter" idx="3"/>
+          </p:nvPr>
+        </p:nvSpPr>
+        <p:spPr>
+          <a:xfrm>
+            <a:off x="685800" y="4400550"/>
+            <a:ext cx="5486400" cy="3600450"/>
+          </a:xfrm>
+          <a:prstGeom prst="rect">
+            <a:avLst/>
+          </a:prstGeom>
+        </p:spPr>
+        <p:txBody>
+          <a:bodyPr vert="horz" lIns="91440" tIns="45720" rIns="91440" bIns="45720" rtlCol="0"/>
+          <a:lstStyle/>
+          <a:p>
+            <a:pPr lvl="0"/>
+            <a:r>
+              <a:rPr lang="en-GB"/>
+              <a:t>Click to edit Master text styles</a:t>
+            </a:r>
+          </a:p>
+          <a:p>
+            <a:pPr lvl="1"/>
+            <a:r>
+              <a:rPr lang="en-GB"/>
+              <a:t>Second level</a:t>
+            </a:r>
+          </a:p>
+          <a:p>
+            <a:pPr lvl="2"/>
+            <a:r>
+              <a:rPr lang="en-GB"/>
+              <a:t>Third level</a:t>
+            </a:r>
+          </a:p>
+          <a:p>
+            <a:pPr lvl="3"/>
+            <a:r>
+              <a:rPr lang="en-GB"/>
+              <a:t>Fourth level</a:t>
+            </a:r>
+          </a:p>
+          <a:p>
+            <a:pPr lvl="4"/>
+            <a:r>
+              <a:rPr lang="en-GB"/>
+              <a:t>Fifth level</a:t>
+            </a:r>
+            <a:endParaRPr lang="en-FR"/>
+          </a:p>
+        </p:txBody>
+      </p:sp>
+      <p:sp>
+        <p:nvSpPr>
+          <p:cNvPr id="6" name="Footer Placeholder 5"/>
+          <p:cNvSpPr>
+            <a:spLocks noGrp="1"/>
+          </p:cNvSpPr>
+          <p:nvPr>
+            <p:ph type="ftr" sz="quarter" idx="4"/>
+          </p:nvPr>
+        </p:nvSpPr>
+        <p:spPr>
+          <a:xfrm>
+            <a:off x="0" y="8685213"/>
+            <a:ext cx="2971800" cy="458787"/>
+          </a:xfrm>
+          <a:prstGeom prst="rect">
+            <a:avLst/>
+          </a:prstGeom>
+        </p:spPr>
+        <p:txBody>
+          <a:bodyPr vert="horz" lIns="91440" tIns="45720" rIns="91440" bIns="45720" rtlCol="0" anchor="b"/>
+          <a:lstStyle>
+            <a:lvl1pPr algn="l">
+              <a:defRPr sz="1200"/>
+            </a:lvl1pPr>
+          </a:lstStyle>
+          <a:p>
+            <a:endParaRPr lang="en-FR"/>
+          </a:p>
+        </p:txBody>
+      </p:sp>
+      <p:sp>
+        <p:nvSpPr>
+          <p:cNvPr id="7" name="Slide Number Placeholder 6"/>
+          <p:cNvSpPr>
+            <a:spLocks noGrp="1"/>
+          </p:cNvSpPr>
+          <p:nvPr>
+            <p:ph type="sldNum" sz="quarter" idx="5"/>
+          </p:nvPr>
+        </p:nvSpPr>
+        <p:spPr>
+          <a:xfrm>
+            <a:off x="3884613" y="8685213"/>
+            <a:ext cx="2971800" cy="458787"/>
+          </a:xfrm>
+          <a:prstGeom prst="rect">
+            <a:avLst/>
+          </a:prstGeom>
+        </p:spPr>
+        <p:txBody>
+          <a:bodyPr vert="horz" lIns="91440" tIns="45720" rIns="91440" bIns="45720" rtlCol="0" anchor="b"/>
+          <a:lstStyle>
+            <a:lvl1pPr algn="r">
+              <a:defRPr sz="1200"/>
+            </a:lvl1pPr>
+          </a:lstStyle>
+          <a:p>
+            <a:fld id="{80FF6685-FA6B-DD42-BE8A-2841A9387CAC}" type="slidenum">
+              <a:rPr lang="en-FR" smtClean="0"/>
+              <a:t>‹#›</a:t>
+            </a:fld>
+            <a:endParaRPr lang="en-FR"/>
+          </a:p>
+        </p:txBody>
+      </p:sp>
+    </p:spTree>
+    <p:extLst>
+      <p:ext uri="{BB962C8B-B14F-4D97-AF65-F5344CB8AC3E}">
+        <p14:creationId xmlns:p14="http://schemas.microsoft.com/office/powerpoint/2010/main" val="2431460208"/>
+      </p:ext>
+    </p:extLst>
+  </p:cSld>
+  <p:clrMap bg1="lt1" tx1="dk1" bg2="lt2" tx2="dk2" accent1="accent1" accent2="accent2" accent3="accent3" accent4="accent4" accent5="accent5" accent6="accent6" hlink="hlink" folHlink="folHlink"/>
+  <p:notesStyle>
+    <a:lvl1pPr marL="0" algn="l" defTabSz="914400" rtl="0" eaLnBrk="1" latinLnBrk="0" hangingPunct="1">
+      <a:defRPr sz="1200" kern="1200">
+        <a:solidFill>
+          <a:schemeClr val="tx1"/>
+        </a:solidFill>
+        <a:latin typeface="+mn-lt"/>
+        <a:ea typeface="+mn-ea"/>
+        <a:cs typeface="+mn-cs"/>
+      </a:defRPr>
+    </a:lvl1pPr>
+    <a:lvl2pPr marL="457200" algn="l" defTabSz="914400" rtl="0" eaLnBrk="1" latinLnBrk="0" hangingPunct="1">
+      <a:defRPr sz="1200" kern="1200">
+        <a:solidFill>
+          <a:schemeClr val="tx1"/>
+        </a:solidFill>
+        <a:latin typeface="+mn-lt"/>
+        <a:ea typeface="+mn-ea"/>
+        <a:cs typeface="+mn-cs"/>
+      </a:defRPr>
+    </a:lvl2pPr>
+    <a:lvl3pPr marL="914400" algn="l" defTabSz="914400" rtl="0" eaLnBrk="1" latinLnBrk="0" hangingPunct="1">
+      <a:defRPr sz="1200" kern="1200">
+        <a:solidFill>
+          <a:schemeClr val="tx1"/>
+        </a:solidFill>
+        <a:latin typeface="+mn-lt"/>
+        <a:ea typeface="+mn-ea"/>
+        <a:cs typeface="+mn-cs"/>
+      </a:defRPr>
+    </a:lvl3pPr>
+    <a:lvl4pPr marL="1371600" algn="l" defTabSz="914400" rtl="0" eaLnBrk="1" latinLnBrk="0" hangingPunct="1">
+      <a:defRPr sz="1200" kern="1200">
+        <a:solidFill>
+          <a:schemeClr val="tx1"/>
+        </a:solidFill>
+        <a:latin typeface="+mn-lt"/>
+        <a:ea typeface="+mn-ea"/>
+        <a:cs typeface="+mn-cs"/>
+      </a:defRPr>
+    </a:lvl4pPr>
+    <a:lvl5pPr marL="1828800" algn="l" defTabSz="914400" rtl="0" eaLnBrk="1" latinLnBrk="0" hangingPunct="1">
+      <a:defRPr sz="1200" kern="1200">
+        <a:solidFill>
+          <a:schemeClr val="tx1"/>
+        </a:solidFill>
+        <a:latin typeface="+mn-lt"/>
+        <a:ea typeface="+mn-ea"/>
+        <a:cs typeface="+mn-cs"/>
+      </a:defRPr>
+    </a:lvl5pPr>
+    <a:lvl6pPr marL="2286000" algn="l" defTabSz="914400" rtl="0" eaLnBrk="1" latinLnBrk="0" hangingPunct="1">
+      <a:defRPr sz="1200" kern="1200">
+        <a:solidFill>
+          <a:schemeClr val="tx1"/>
+        </a:solidFill>
+        <a:latin typeface="+mn-lt"/>
+        <a:ea typeface="+mn-ea"/>
+        <a:cs typeface="+mn-cs"/>
+      </a:defRPr>
+    </a:lvl6pPr>
+    <a:lvl7pPr marL="2743200" algn="l" defTabSz="914400" rtl="0" eaLnBrk="1" latinLnBrk="0" hangingPunct="1">
+      <a:defRPr sz="1200" kern="1200">
+        <a:solidFill>
+          <a:schemeClr val="tx1"/>
+        </a:solidFill>
+        <a:latin typeface="+mn-lt"/>
+        <a:ea typeface="+mn-ea"/>
+        <a:cs typeface="+mn-cs"/>
+      </a:defRPr>
+    </a:lvl7pPr>
+    <a:lvl8pPr marL="3200400" algn="l" defTabSz="914400" rtl="0" eaLnBrk="1" latinLnBrk="0" hangingPunct="1">
+      <a:defRPr sz="1200" kern="1200">
+        <a:solidFill>
+          <a:schemeClr val="tx1"/>
+        </a:solidFill>
+        <a:latin typeface="+mn-lt"/>
+        <a:ea typeface="+mn-ea"/>
+        <a:cs typeface="+mn-cs"/>
+      </a:defRPr>
+    </a:lvl8pPr>
+    <a:lvl9pPr marL="3657600" algn="l" defTabSz="914400" rtl="0" eaLnBrk="1" latinLnBrk="0" hangingPunct="1">
+      <a:defRPr sz="1200" kern="1200">
+        <a:solidFill>
+          <a:schemeClr val="tx1"/>
+        </a:solidFill>
+        <a:latin typeface="+mn-lt"/>
+        <a:ea typeface="+mn-ea"/>
+        <a:cs typeface="+mn-cs"/>
+      </a:defRPr>
+    </a:lvl9pPr>
+  </p:notesStyle>
+</p:notesMaster>
+</file>
+
 <file path=ppt/slideLayouts/slideLayout1.xml><?xml version="1.0" encoding="utf-8"?>
 <p:sldLayout xmlns:a="http://schemas.openxmlformats.org/drawingml/2006/main" xmlns:r="http://schemas.openxmlformats.org/officeDocument/2006/relationships" xmlns:p="http://schemas.openxmlformats.org/presentationml/2006/main" type="title" preserve="1">
   <p:cSld name="Title Slide">
@@ -262,9 +616,9 @@
           <a:bodyPr/>
           <a:lstStyle/>
           <a:p>
-            <a:fld id="{7CD783A5-BC47-ED4D-84DA-4F8B01B4E4C0}" type="datetimeFigureOut">
-              <a:rPr lang="en-FR" smtClean="0"/>
-              <a:t>05/01/2026</a:t>
+            <a:fld id="{DA09BA13-23F9-2342-9CA2-CF9B62A639A9}" type="datetime1">
+              <a:rPr lang="fr-FR" smtClean="0"/>
+              <a:t>06/01/2026</a:t>
             </a:fld>
             <a:endParaRPr lang="en-FR"/>
           </a:p>
@@ -291,6 +645,10 @@
           <a:bodyPr/>
           <a:lstStyle/>
           <a:p>
+            <a:r>
+              <a:rPr lang="en-GB"/>
+              <a:t>CISO Assistant</a:t>
+            </a:r>
             <a:endParaRPr lang="en-FR"/>
           </a:p>
         </p:txBody>
@@ -462,9 +820,9 @@
           <a:bodyPr/>
           <a:lstStyle/>
           <a:p>
-            <a:fld id="{7CD783A5-BC47-ED4D-84DA-4F8B01B4E4C0}" type="datetimeFigureOut">
-              <a:rPr lang="en-FR" smtClean="0"/>
-              <a:t>05/01/2026</a:t>
+            <a:fld id="{F0A2223C-5447-8D4F-ABC0-D9DD3FA32D1B}" type="datetime1">
+              <a:rPr lang="fr-FR" smtClean="0"/>
+              <a:t>06/01/2026</a:t>
             </a:fld>
             <a:endParaRPr lang="en-FR"/>
           </a:p>
@@ -491,6 +849,10 @@
           <a:bodyPr/>
           <a:lstStyle/>
           <a:p>
+            <a:r>
+              <a:rPr lang="en-GB"/>
+              <a:t>CISO Assistant</a:t>
+            </a:r>
             <a:endParaRPr lang="en-FR"/>
           </a:p>
         </p:txBody>
@@ -672,9 +1034,9 @@
           <a:bodyPr/>
           <a:lstStyle/>
           <a:p>
-            <a:fld id="{7CD783A5-BC47-ED4D-84DA-4F8B01B4E4C0}" type="datetimeFigureOut">
-              <a:rPr lang="en-FR" smtClean="0"/>
-              <a:t>05/01/2026</a:t>
+            <a:fld id="{5DB3B30E-67D2-1C44-BD3F-29009E72BB7F}" type="datetime1">
+              <a:rPr lang="fr-FR" smtClean="0"/>
+              <a:t>06/01/2026</a:t>
             </a:fld>
             <a:endParaRPr lang="en-FR"/>
           </a:p>
@@ -701,6 +1063,10 @@
           <a:bodyPr/>
           <a:lstStyle/>
           <a:p>
+            <a:r>
+              <a:rPr lang="en-GB"/>
+              <a:t>CISO Assistant</a:t>
+            </a:r>
             <a:endParaRPr lang="en-FR"/>
           </a:p>
         </p:txBody>
@@ -872,9 +1238,9 @@
           <a:bodyPr/>
           <a:lstStyle/>
           <a:p>
-            <a:fld id="{7CD783A5-BC47-ED4D-84DA-4F8B01B4E4C0}" type="datetimeFigureOut">
-              <a:rPr lang="en-FR" smtClean="0"/>
-              <a:t>05/01/2026</a:t>
+            <a:fld id="{6E44F59B-EF59-644B-98D3-1AE093B2C78D}" type="datetime1">
+              <a:rPr lang="fr-FR" smtClean="0"/>
+              <a:t>06/01/2026</a:t>
             </a:fld>
             <a:endParaRPr lang="en-FR"/>
           </a:p>
@@ -901,6 +1267,10 @@
           <a:bodyPr/>
           <a:lstStyle/>
           <a:p>
+            <a:r>
+              <a:rPr lang="en-GB"/>
+              <a:t>CISO Assistant</a:t>
+            </a:r>
             <a:endParaRPr lang="en-FR"/>
           </a:p>
         </p:txBody>
@@ -1148,9 +1518,9 @@
           <a:bodyPr/>
           <a:lstStyle/>
           <a:p>
-            <a:fld id="{7CD783A5-BC47-ED4D-84DA-4F8B01B4E4C0}" type="datetimeFigureOut">
-              <a:rPr lang="en-FR" smtClean="0"/>
-              <a:t>05/01/2026</a:t>
+            <a:fld id="{8A381694-F416-DD41-8D17-98BCFE34C3EF}" type="datetime1">
+              <a:rPr lang="fr-FR" smtClean="0"/>
+              <a:t>06/01/2026</a:t>
             </a:fld>
             <a:endParaRPr lang="en-FR"/>
           </a:p>
@@ -1177,6 +1547,10 @@
           <a:bodyPr/>
           <a:lstStyle/>
           <a:p>
+            <a:r>
+              <a:rPr lang="en-GB"/>
+              <a:t>CISO Assistant</a:t>
+            </a:r>
             <a:endParaRPr lang="en-FR"/>
           </a:p>
         </p:txBody>
@@ -1416,9 +1790,9 @@
           <a:bodyPr/>
           <a:lstStyle/>
           <a:p>
-            <a:fld id="{7CD783A5-BC47-ED4D-84DA-4F8B01B4E4C0}" type="datetimeFigureOut">
-              <a:rPr lang="en-FR" smtClean="0"/>
-              <a:t>05/01/2026</a:t>
+            <a:fld id="{B7C1F917-E753-E142-876D-E95DD36C7EC8}" type="datetime1">
+              <a:rPr lang="fr-FR" smtClean="0"/>
+              <a:t>06/01/2026</a:t>
             </a:fld>
             <a:endParaRPr lang="en-FR"/>
           </a:p>
@@ -1445,6 +1819,10 @@
           <a:bodyPr/>
           <a:lstStyle/>
           <a:p>
+            <a:r>
+              <a:rPr lang="en-GB"/>
+              <a:t>CISO Assistant</a:t>
+            </a:r>
             <a:endParaRPr lang="en-FR"/>
           </a:p>
         </p:txBody>
@@ -1831,9 +2209,9 @@
           <a:bodyPr/>
           <a:lstStyle/>
           <a:p>
-            <a:fld id="{7CD783A5-BC47-ED4D-84DA-4F8B01B4E4C0}" type="datetimeFigureOut">
-              <a:rPr lang="en-FR" smtClean="0"/>
-              <a:t>05/01/2026</a:t>
+            <a:fld id="{4A620DDD-23E5-C54A-AACD-A010625AFFBE}" type="datetime1">
+              <a:rPr lang="fr-FR" smtClean="0"/>
+              <a:t>06/01/2026</a:t>
             </a:fld>
             <a:endParaRPr lang="en-FR"/>
           </a:p>
@@ -1860,6 +2238,10 @@
           <a:bodyPr/>
           <a:lstStyle/>
           <a:p>
+            <a:r>
+              <a:rPr lang="en-GB"/>
+              <a:t>CISO Assistant</a:t>
+            </a:r>
             <a:endParaRPr lang="en-FR"/>
           </a:p>
         </p:txBody>
@@ -1973,9 +2355,9 @@
           <a:bodyPr/>
           <a:lstStyle/>
           <a:p>
-            <a:fld id="{7CD783A5-BC47-ED4D-84DA-4F8B01B4E4C0}" type="datetimeFigureOut">
-              <a:rPr lang="en-FR" smtClean="0"/>
-              <a:t>05/01/2026</a:t>
+            <a:fld id="{04EA8572-591D-034A-B80F-B8D6783EE3E6}" type="datetime1">
+              <a:rPr lang="fr-FR" smtClean="0"/>
+              <a:t>06/01/2026</a:t>
             </a:fld>
             <a:endParaRPr lang="en-FR"/>
           </a:p>
@@ -2002,6 +2384,10 @@
           <a:bodyPr/>
           <a:lstStyle/>
           <a:p>
+            <a:r>
+              <a:rPr lang="en-GB"/>
+              <a:t>CISO Assistant</a:t>
+            </a:r>
             <a:endParaRPr lang="en-FR"/>
           </a:p>
         </p:txBody>
@@ -2086,9 +2472,9 @@
           <a:bodyPr/>
           <a:lstStyle/>
           <a:p>
-            <a:fld id="{7CD783A5-BC47-ED4D-84DA-4F8B01B4E4C0}" type="datetimeFigureOut">
-              <a:rPr lang="en-FR" smtClean="0"/>
-              <a:t>05/01/2026</a:t>
+            <a:fld id="{80CD6444-779C-BE45-9EAC-EFC2F033B994}" type="datetime1">
+              <a:rPr lang="fr-FR" smtClean="0"/>
+              <a:t>06/01/2026</a:t>
             </a:fld>
             <a:endParaRPr lang="en-FR"/>
           </a:p>
@@ -2115,6 +2501,10 @@
           <a:bodyPr/>
           <a:lstStyle/>
           <a:p>
+            <a:r>
+              <a:rPr lang="en-GB"/>
+              <a:t>CISO Assistant</a:t>
+            </a:r>
             <a:endParaRPr lang="en-FR"/>
           </a:p>
         </p:txBody>
@@ -2399,9 +2789,9 @@
           <a:bodyPr/>
           <a:lstStyle/>
           <a:p>
-            <a:fld id="{7CD783A5-BC47-ED4D-84DA-4F8B01B4E4C0}" type="datetimeFigureOut">
-              <a:rPr lang="en-FR" smtClean="0"/>
-              <a:t>05/01/2026</a:t>
+            <a:fld id="{E0ED1FC6-41EB-9142-9607-05B1E5D50B35}" type="datetime1">
+              <a:rPr lang="fr-FR" smtClean="0"/>
+              <a:t>06/01/2026</a:t>
             </a:fld>
             <a:endParaRPr lang="en-FR"/>
           </a:p>
@@ -2428,6 +2818,10 @@
           <a:bodyPr/>
           <a:lstStyle/>
           <a:p>
+            <a:r>
+              <a:rPr lang="en-GB"/>
+              <a:t>CISO Assistant</a:t>
+            </a:r>
             <a:endParaRPr lang="en-FR"/>
           </a:p>
         </p:txBody>
@@ -2688,9 +3082,9 @@
           <a:bodyPr/>
           <a:lstStyle/>
           <a:p>
-            <a:fld id="{7CD783A5-BC47-ED4D-84DA-4F8B01B4E4C0}" type="datetimeFigureOut">
-              <a:rPr lang="en-FR" smtClean="0"/>
-              <a:t>05/01/2026</a:t>
+            <a:fld id="{59EF8D94-A458-A84A-BA02-AB685A73A9FC}" type="datetime1">
+              <a:rPr lang="fr-FR" smtClean="0"/>
+              <a:t>06/01/2026</a:t>
             </a:fld>
             <a:endParaRPr lang="en-FR"/>
           </a:p>
@@ -2717,6 +3111,10 @@
           <a:bodyPr/>
           <a:lstStyle/>
           <a:p>
+            <a:r>
+              <a:rPr lang="en-GB"/>
+              <a:t>CISO Assistant</a:t>
+            </a:r>
             <a:endParaRPr lang="en-FR"/>
           </a:p>
         </p:txBody>
@@ -2931,9 +3329,9 @@
             </a:lvl1pPr>
           </a:lstStyle>
           <a:p>
-            <a:fld id="{7CD783A5-BC47-ED4D-84DA-4F8B01B4E4C0}" type="datetimeFigureOut">
-              <a:rPr lang="en-FR" smtClean="0"/>
-              <a:t>05/01/2026</a:t>
+            <a:fld id="{46BED62B-F076-364B-904C-3D7464096D70}" type="datetime1">
+              <a:rPr lang="fr-FR" smtClean="0"/>
+              <a:t>06/01/2026</a:t>
             </a:fld>
             <a:endParaRPr lang="en-FR"/>
           </a:p>
@@ -2978,6 +3376,10 @@
             </a:lvl1pPr>
           </a:lstStyle>
           <a:p>
+            <a:r>
+              <a:rPr lang="en-GB"/>
+              <a:t>CISO Assistant</a:t>
+            </a:r>
             <a:endParaRPr lang="en-FR"/>
           </a:p>
         </p:txBody>
@@ -3050,6 +3452,7 @@
     <p:sldLayoutId id="2147483658" r:id="rId10"/>
     <p:sldLayoutId id="2147483659" r:id="rId11"/>
   </p:sldLayoutIdLst>
+  <p:hf sldNum="0" hdr="0" dt="0"/>
   <p:txStyles>
     <p:titleStyle>
       <a:lvl1pPr algn="l" defTabSz="914400" rtl="0" eaLnBrk="1" latinLnBrk="0" hangingPunct="1">
@@ -3413,7 +3816,7 @@
           <a:p>
             <a:r>
               <a:rPr lang="en-FR" dirty="0"/>
-              <a:t>CISO Assistant – audit report</a:t>
+              <a:t>audit report</a:t>
             </a:r>
           </a:p>
           <a:p>
@@ -3487,65 +3890,74 @@
           <a:lstStyle/>
           <a:p>
             <a:r>
+              <a:rPr lang="en-FR" sz="2400" dirty="0"/>
+              <a:t>scope</a:t>
+            </a:r>
+            <a:br>
               <a:rPr lang="en-FR" dirty="0"/>
-              <a:t>Compliance overview</a:t>
-            </a:r>
-          </a:p>
-        </p:txBody>
-      </p:sp>
-      <p:sp>
-        <p:nvSpPr>
-          <p:cNvPr id="8" name="Rectangle 7">
-            <a:extLst>
-              <a:ext uri="{FF2B5EF4-FFF2-40B4-BE49-F238E27FC236}">
-                <a16:creationId xmlns:a16="http://schemas.microsoft.com/office/drawing/2014/main" id="{B0BE4B8C-4514-D35C-1363-F69A5A687542}"/>
-              </a:ext>
-            </a:extLst>
-          </p:cNvPr>
-          <p:cNvSpPr/>
-          <p:nvPr/>
-        </p:nvSpPr>
-        <p:spPr>
-          <a:xfrm>
-            <a:off x="3535997" y="2582920"/>
-            <a:ext cx="5399405" cy="3239770"/>
-          </a:xfrm>
-          <a:prstGeom prst="rect">
-            <a:avLst/>
-          </a:prstGeom>
-        </p:spPr>
-        <p:style>
-          <a:lnRef idx="2">
-            <a:schemeClr val="accent1">
-              <a:shade val="15000"/>
-            </a:schemeClr>
-          </a:lnRef>
-          <a:fillRef idx="1">
-            <a:schemeClr val="accent1"/>
-          </a:fillRef>
-          <a:effectRef idx="0">
-            <a:schemeClr val="accent1"/>
-          </a:effectRef>
-          <a:fontRef idx="minor">
-            <a:schemeClr val="lt1"/>
-          </a:fontRef>
-        </p:style>
-        <p:txBody>
-          <a:bodyPr rtlCol="0" anchor="ctr"/>
-          <a:lstStyle/>
-          <a:p>
-            <a:pPr algn="ctr"/>
+            </a:br>
+            <a:r>
+              <a:rPr lang="en-FR" dirty="0"/>
+              <a:t>{{perimeter_name}}</a:t>
+            </a:r>
+          </a:p>
+        </p:txBody>
+      </p:sp>
+      <p:sp>
+        <p:nvSpPr>
+          <p:cNvPr id="4" name="Content Placeholder 3">
+            <a:extLst>
+              <a:ext uri="{FF2B5EF4-FFF2-40B4-BE49-F238E27FC236}">
+                <a16:creationId xmlns:a16="http://schemas.microsoft.com/office/drawing/2014/main" id="{9769DA97-D17F-D042-747A-075D46251524}"/>
+              </a:ext>
+            </a:extLst>
+          </p:cNvPr>
+          <p:cNvSpPr>
+            <a:spLocks noGrp="1"/>
+          </p:cNvSpPr>
+          <p:nvPr>
+            <p:ph idx="1"/>
+          </p:nvPr>
+        </p:nvSpPr>
+        <p:spPr/>
+        <p:txBody>
+          <a:bodyPr/>
+          <a:lstStyle/>
+          <a:p>
+            <a:pPr marL="0" indent="0">
+              <a:buNone/>
+            </a:pPr>
+            <a:r>
+              <a:rPr lang="en-FR" dirty="0"/>
+              <a:t>{{perimeter_description}}</a:t>
+            </a:r>
+          </a:p>
+        </p:txBody>
+      </p:sp>
+      <p:sp>
+        <p:nvSpPr>
+          <p:cNvPr id="3" name="Footer Placeholder 2">
+            <a:extLst>
+              <a:ext uri="{FF2B5EF4-FFF2-40B4-BE49-F238E27FC236}">
+                <a16:creationId xmlns:a16="http://schemas.microsoft.com/office/drawing/2014/main" id="{B3E208CD-6F9D-A87E-62E1-786C52A971EE}"/>
+              </a:ext>
+            </a:extLst>
+          </p:cNvPr>
+          <p:cNvSpPr>
+            <a:spLocks noGrp="1"/>
+          </p:cNvSpPr>
+          <p:nvPr>
+            <p:ph type="ftr" sz="quarter" idx="11"/>
+          </p:nvPr>
+        </p:nvSpPr>
+        <p:spPr/>
+        <p:txBody>
+          <a:bodyPr/>
+          <a:lstStyle/>
+          <a:p>
             <a:r>
               <a:rPr lang="en-GB" dirty="0"/>
-              <a:t>{{</a:t>
-            </a:r>
-            <a:r>
-              <a:rPr lang="en-GB" dirty="0" err="1"/>
-              <a:t>compliance_donut</a:t>
-            </a:r>
-            <a:r>
-              <a:rPr lang="en-GB" dirty="0"/>
-              <a:t>}}</a:t>
+              <a:t>CISO Assistant</a:t>
             </a:r>
             <a:endParaRPr lang="en-FR" dirty="0"/>
           </a:p>
@@ -3554,7 +3966,7 @@
     </p:spTree>
     <p:extLst>
       <p:ext uri="{BB962C8B-B14F-4D97-AF65-F5344CB8AC3E}">
-        <p14:creationId xmlns:p14="http://schemas.microsoft.com/office/powerpoint/2010/main" val="3953274088"/>
+        <p14:creationId xmlns:p14="http://schemas.microsoft.com/office/powerpoint/2010/main" val="2409308083"/>
       </p:ext>
     </p:extLst>
   </p:cSld>
@@ -3586,7 +3998,7 @@
           <p:cNvPr id="2" name="Title 1">
             <a:extLst>
               <a:ext uri="{FF2B5EF4-FFF2-40B4-BE49-F238E27FC236}">
-                <a16:creationId xmlns:a16="http://schemas.microsoft.com/office/drawing/2014/main" id="{3FF955CE-8BD2-7DD6-59A6-0C63AB649903}"/>
+                <a16:creationId xmlns:a16="http://schemas.microsoft.com/office/drawing/2014/main" id="{25F2C3F3-AE9B-80B9-5DF6-0DC44453D321}"/>
               </a:ext>
             </a:extLst>
           </p:cNvPr>
@@ -3604,17 +4016,17 @@
           <a:p>
             <a:r>
               <a:rPr lang="en-FR" dirty="0"/>
-              <a:t>Controls breakdown</a:t>
-            </a:r>
-          </a:p>
-        </p:txBody>
-      </p:sp>
-      <p:sp>
-        <p:nvSpPr>
-          <p:cNvPr id="5" name="Rectangle 4">
-            <a:extLst>
-              <a:ext uri="{FF2B5EF4-FFF2-40B4-BE49-F238E27FC236}">
-                <a16:creationId xmlns:a16="http://schemas.microsoft.com/office/drawing/2014/main" id="{6F52AE81-2B76-70F5-2E6F-D5D477BEAD9B}"/>
+              <a:t>Compliance overview</a:t>
+            </a:r>
+          </a:p>
+        </p:txBody>
+      </p:sp>
+      <p:sp>
+        <p:nvSpPr>
+          <p:cNvPr id="8" name="Rectangle 7">
+            <a:extLst>
+              <a:ext uri="{FF2B5EF4-FFF2-40B4-BE49-F238E27FC236}">
+                <a16:creationId xmlns:a16="http://schemas.microsoft.com/office/drawing/2014/main" id="{B0BE4B8C-4514-D35C-1363-F69A5A687542}"/>
               </a:ext>
             </a:extLst>
           </p:cNvPr>
@@ -3623,7 +4035,7 @@
         </p:nvSpPr>
         <p:spPr>
           <a:xfrm>
-            <a:off x="3778664" y="2369203"/>
+            <a:off x="3535997" y="2582920"/>
             <a:ext cx="5399405" cy="3239770"/>
           </a:xfrm>
           <a:prstGeom prst="rect">
@@ -3652,16 +4064,54 @@
           <a:p>
             <a:pPr algn="ctr"/>
             <a:r>
-              <a:rPr lang="en-FR" dirty="0"/>
-              <a:t>{{chart_controls}}</a:t>
-            </a:r>
+              <a:rPr lang="en-GB" dirty="0"/>
+              <a:t>{{</a:t>
+            </a:r>
+            <a:r>
+              <a:rPr lang="en-GB" dirty="0" err="1"/>
+              <a:t>compliance_donut</a:t>
+            </a:r>
+            <a:r>
+              <a:rPr lang="en-GB" dirty="0"/>
+              <a:t>}}</a:t>
+            </a:r>
+            <a:endParaRPr lang="en-FR" dirty="0"/>
+          </a:p>
+        </p:txBody>
+      </p:sp>
+      <p:sp>
+        <p:nvSpPr>
+          <p:cNvPr id="9" name="Footer Placeholder 8">
+            <a:extLst>
+              <a:ext uri="{FF2B5EF4-FFF2-40B4-BE49-F238E27FC236}">
+                <a16:creationId xmlns:a16="http://schemas.microsoft.com/office/drawing/2014/main" id="{7E9A0DDC-CF90-CA8A-C070-B6B28FF00309}"/>
+              </a:ext>
+            </a:extLst>
+          </p:cNvPr>
+          <p:cNvSpPr>
+            <a:spLocks noGrp="1"/>
+          </p:cNvSpPr>
+          <p:nvPr>
+            <p:ph type="ftr" sz="quarter" idx="11"/>
+          </p:nvPr>
+        </p:nvSpPr>
+        <p:spPr/>
+        <p:txBody>
+          <a:bodyPr/>
+          <a:lstStyle/>
+          <a:p>
+            <a:r>
+              <a:rPr lang="en-GB"/>
+              <a:t>CISO Assistant</a:t>
+            </a:r>
+            <a:endParaRPr lang="en-FR"/>
           </a:p>
         </p:txBody>
       </p:sp>
     </p:spTree>
     <p:extLst>
       <p:ext uri="{BB962C8B-B14F-4D97-AF65-F5344CB8AC3E}">
-        <p14:creationId xmlns:p14="http://schemas.microsoft.com/office/powerpoint/2010/main" val="121933325"/>
+        <p14:creationId xmlns:p14="http://schemas.microsoft.com/office/powerpoint/2010/main" val="3953274088"/>
       </p:ext>
     </p:extLst>
   </p:cSld>
@@ -3693,6 +4143,142 @@
           <p:cNvPr id="2" name="Title 1">
             <a:extLst>
               <a:ext uri="{FF2B5EF4-FFF2-40B4-BE49-F238E27FC236}">
+                <a16:creationId xmlns:a16="http://schemas.microsoft.com/office/drawing/2014/main" id="{3FF955CE-8BD2-7DD6-59A6-0C63AB649903}"/>
+              </a:ext>
+            </a:extLst>
+          </p:cNvPr>
+          <p:cNvSpPr>
+            <a:spLocks noGrp="1"/>
+          </p:cNvSpPr>
+          <p:nvPr>
+            <p:ph type="title"/>
+          </p:nvPr>
+        </p:nvSpPr>
+        <p:spPr/>
+        <p:txBody>
+          <a:bodyPr/>
+          <a:lstStyle/>
+          <a:p>
+            <a:r>
+              <a:rPr lang="en-FR" dirty="0"/>
+              <a:t>Controls breakdown</a:t>
+            </a:r>
+          </a:p>
+        </p:txBody>
+      </p:sp>
+      <p:sp>
+        <p:nvSpPr>
+          <p:cNvPr id="5" name="Rectangle 4">
+            <a:extLst>
+              <a:ext uri="{FF2B5EF4-FFF2-40B4-BE49-F238E27FC236}">
+                <a16:creationId xmlns:a16="http://schemas.microsoft.com/office/drawing/2014/main" id="{6F52AE81-2B76-70F5-2E6F-D5D477BEAD9B}"/>
+              </a:ext>
+            </a:extLst>
+          </p:cNvPr>
+          <p:cNvSpPr/>
+          <p:nvPr/>
+        </p:nvSpPr>
+        <p:spPr>
+          <a:xfrm>
+            <a:off x="3778664" y="2369203"/>
+            <a:ext cx="5399405" cy="3239770"/>
+          </a:xfrm>
+          <a:prstGeom prst="rect">
+            <a:avLst/>
+          </a:prstGeom>
+        </p:spPr>
+        <p:style>
+          <a:lnRef idx="2">
+            <a:schemeClr val="accent1">
+              <a:shade val="15000"/>
+            </a:schemeClr>
+          </a:lnRef>
+          <a:fillRef idx="1">
+            <a:schemeClr val="accent1"/>
+          </a:fillRef>
+          <a:effectRef idx="0">
+            <a:schemeClr val="accent1"/>
+          </a:effectRef>
+          <a:fontRef idx="minor">
+            <a:schemeClr val="lt1"/>
+          </a:fontRef>
+        </p:style>
+        <p:txBody>
+          <a:bodyPr rtlCol="0" anchor="ctr"/>
+          <a:lstStyle/>
+          <a:p>
+            <a:pPr algn="ctr"/>
+            <a:r>
+              <a:rPr lang="en-FR" dirty="0"/>
+              <a:t>{{chart_controls}}</a:t>
+            </a:r>
+          </a:p>
+        </p:txBody>
+      </p:sp>
+      <p:sp>
+        <p:nvSpPr>
+          <p:cNvPr id="6" name="Footer Placeholder 5">
+            <a:extLst>
+              <a:ext uri="{FF2B5EF4-FFF2-40B4-BE49-F238E27FC236}">
+                <a16:creationId xmlns:a16="http://schemas.microsoft.com/office/drawing/2014/main" id="{AB2A9298-2B02-6748-D803-C44712186298}"/>
+              </a:ext>
+            </a:extLst>
+          </p:cNvPr>
+          <p:cNvSpPr>
+            <a:spLocks noGrp="1"/>
+          </p:cNvSpPr>
+          <p:nvPr>
+            <p:ph type="ftr" sz="quarter" idx="11"/>
+          </p:nvPr>
+        </p:nvSpPr>
+        <p:spPr/>
+        <p:txBody>
+          <a:bodyPr/>
+          <a:lstStyle/>
+          <a:p>
+            <a:r>
+              <a:rPr lang="en-GB"/>
+              <a:t>CISO Assistant</a:t>
+            </a:r>
+            <a:endParaRPr lang="en-FR"/>
+          </a:p>
+        </p:txBody>
+      </p:sp>
+    </p:spTree>
+    <p:extLst>
+      <p:ext uri="{BB962C8B-B14F-4D97-AF65-F5344CB8AC3E}">
+        <p14:creationId xmlns:p14="http://schemas.microsoft.com/office/powerpoint/2010/main" val="121933325"/>
+      </p:ext>
+    </p:extLst>
+  </p:cSld>
+  <p:clrMapOvr>
+    <a:masterClrMapping/>
+  </p:clrMapOvr>
+</p:sld>
+</file>
+
+<file path=ppt/slides/slide5.xml><?xml version="1.0" encoding="utf-8"?>
+<p:sld xmlns:a="http://schemas.openxmlformats.org/drawingml/2006/main" xmlns:r="http://schemas.openxmlformats.org/officeDocument/2006/relationships" xmlns:p="http://schemas.openxmlformats.org/presentationml/2006/main">
+  <p:cSld>
+    <p:spTree>
+      <p:nvGrpSpPr>
+        <p:cNvPr id="1" name=""/>
+        <p:cNvGrpSpPr/>
+        <p:nvPr/>
+      </p:nvGrpSpPr>
+      <p:grpSpPr>
+        <a:xfrm>
+          <a:off x="0" y="0"/>
+          <a:ext cx="0" cy="0"/>
+          <a:chOff x="0" y="0"/>
+          <a:chExt cx="0" cy="0"/>
+        </a:xfrm>
+      </p:grpSpPr>
+      <p:sp>
+        <p:nvSpPr>
+          <p:cNvPr id="2" name="Title 1">
+            <a:extLst>
+              <a:ext uri="{FF2B5EF4-FFF2-40B4-BE49-F238E27FC236}">
                 <a16:creationId xmlns:a16="http://schemas.microsoft.com/office/drawing/2014/main" id="{FFF777E3-CD97-C5A0-4E84-AE49469FB37D}"/>
               </a:ext>
             </a:extLst>
@@ -3738,25 +4324,56 @@
         </p:nvSpPr>
         <p:spPr/>
         <p:txBody>
-          <a:bodyPr/>
+          <a:bodyPr>
+            <a:normAutofit/>
+          </a:bodyPr>
           <a:lstStyle/>
           <a:p>
             <a:pPr marL="0" indent="0">
               <a:buNone/>
             </a:pPr>
             <a:r>
-              <a:rPr lang="en-GB" dirty="0"/>
+              <a:rPr lang="en-GB" sz="2000" dirty="0"/>
               <a:t>{{</a:t>
             </a:r>
             <a:r>
-              <a:rPr lang="en-GB" dirty="0" err="1"/>
+              <a:rPr lang="en-GB" sz="2000" dirty="0" err="1"/>
               <a:t>table_full_controls</a:t>
             </a:r>
             <a:r>
-              <a:rPr lang="en-GB" dirty="0"/>
+              <a:rPr lang="en-GB" sz="2000" dirty="0"/>
               <a:t>}}</a:t>
             </a:r>
-            <a:endParaRPr lang="en-FR" dirty="0"/>
+            <a:endParaRPr lang="en-FR" sz="2000" dirty="0"/>
+          </a:p>
+        </p:txBody>
+      </p:sp>
+      <p:sp>
+        <p:nvSpPr>
+          <p:cNvPr id="4" name="Footer Placeholder 3">
+            <a:extLst>
+              <a:ext uri="{FF2B5EF4-FFF2-40B4-BE49-F238E27FC236}">
+                <a16:creationId xmlns:a16="http://schemas.microsoft.com/office/drawing/2014/main" id="{E11426D3-6642-C6BC-5554-8F20F944E7D5}"/>
+              </a:ext>
+            </a:extLst>
+          </p:cNvPr>
+          <p:cNvSpPr>
+            <a:spLocks noGrp="1"/>
+          </p:cNvSpPr>
+          <p:nvPr>
+            <p:ph type="ftr" sz="quarter" idx="11"/>
+          </p:nvPr>
+        </p:nvSpPr>
+        <p:spPr/>
+        <p:txBody>
+          <a:bodyPr/>
+          <a:lstStyle/>
+          <a:p>
+            <a:r>
+              <a:rPr lang="en-GB"/>
+              <a:t>CISO Assistant</a:t>
+            </a:r>
+            <a:endParaRPr lang="en-FR"/>
           </a:p>
         </p:txBody>
       </p:sp>
@@ -4086,4 +4703,319 @@
     </a:ext>
   </a:extLst>
 </a:theme>
+</file>
+
+<file path=ppt/theme/theme2.xml><?xml version="1.0" encoding="utf-8"?>
+<a:theme xmlns:a="http://schemas.openxmlformats.org/drawingml/2006/main" name="Office Theme">
+  <a:themeElements>
+    <a:clrScheme name="Office">
+      <a:dk1>
+        <a:sysClr val="windowText" lastClr="000000"/>
+      </a:dk1>
+      <a:lt1>
+        <a:sysClr val="window" lastClr="FFFFFF"/>
+      </a:lt1>
+      <a:dk2>
+        <a:srgbClr val="0E2841"/>
+      </a:dk2>
+      <a:lt2>
+        <a:srgbClr val="E8E8E8"/>
+      </a:lt2>
+      <a:accent1>
+        <a:srgbClr val="156082"/>
+      </a:accent1>
+      <a:accent2>
+        <a:srgbClr val="E97132"/>
+      </a:accent2>
+      <a:accent3>
+        <a:srgbClr val="196B24"/>
+      </a:accent3>
+      <a:accent4>
+        <a:srgbClr val="0F9ED5"/>
+      </a:accent4>
+      <a:accent5>
+        <a:srgbClr val="A02B93"/>
+      </a:accent5>
+      <a:accent6>
+        <a:srgbClr val="4EA72E"/>
+      </a:accent6>
+      <a:hlink>
+        <a:srgbClr val="467886"/>
+      </a:hlink>
+      <a:folHlink>
+        <a:srgbClr val="96607D"/>
+      </a:folHlink>
+    </a:clrScheme>
+    <a:fontScheme name="Office">
+      <a:majorFont>
+        <a:latin typeface="Aptos Display" panose="02110004020202020204"/>
+        <a:ea typeface=""/>
+        <a:cs typeface=""/>
+        <a:font script="Jpan" typeface="游ゴシック Light"/>
+        <a:font script="Hang" typeface="맑은 고딕"/>
+        <a:font script="Hans" typeface="等线 Light"/>
+        <a:font script="Hant" typeface="新細明體"/>
+        <a:font script="Arab" typeface="Times New Roman"/>
+        <a:font script="Hebr" typeface="Times New Roman"/>
+        <a:font script="Thai" typeface="Angsana New"/>
+        <a:font script="Ethi" typeface="Nyala"/>
+        <a:font script="Beng" typeface="Vrinda"/>
+        <a:font script="Gujr" typeface="Shruti"/>
+        <a:font script="Khmr" typeface="MoolBoran"/>
+        <a:font script="Knda" typeface="Tunga"/>
+        <a:font script="Guru" typeface="Raavi"/>
+        <a:font script="Cans" typeface="Euphemia"/>
+        <a:font script="Cher" typeface="Plantagenet Cherokee"/>
+        <a:font script="Yiii" typeface="Microsoft Yi Baiti"/>
+        <a:font script="Tibt" typeface="Microsoft Himalaya"/>
+        <a:font script="Thaa" typeface="MV Boli"/>
+        <a:font script="Deva" typeface="Mangal"/>
+        <a:font script="Telu" typeface="Gautami"/>
+        <a:font script="Taml" typeface="Latha"/>
+        <a:font script="Syrc" typeface="Estrangelo Edessa"/>
+        <a:font script="Orya" typeface="Kalinga"/>
+        <a:font script="Mlym" typeface="Kartika"/>
+        <a:font script="Laoo" typeface="DokChampa"/>
+        <a:font script="Sinh" typeface="Iskoola Pota"/>
+        <a:font script="Mong" typeface="Mongolian Baiti"/>
+        <a:font script="Viet" typeface="Times New Roman"/>
+        <a:font script="Uigh" typeface="Microsoft Uighur"/>
+        <a:font script="Geor" typeface="Sylfaen"/>
+        <a:font script="Armn" typeface="Arial"/>
+        <a:font script="Bugi" typeface="Leelawadee UI"/>
+        <a:font script="Bopo" typeface="Microsoft JhengHei"/>
+        <a:font script="Java" typeface="Javanese Text"/>
+        <a:font script="Lisu" typeface="Segoe UI"/>
+        <a:font script="Mymr" typeface="Myanmar Text"/>
+        <a:font script="Nkoo" typeface="Ebrima"/>
+        <a:font script="Olck" typeface="Nirmala UI"/>
+        <a:font script="Osma" typeface="Ebrima"/>
+        <a:font script="Phag" typeface="Phagspa"/>
+        <a:font script="Syrn" typeface="Estrangelo Edessa"/>
+        <a:font script="Syrj" typeface="Estrangelo Edessa"/>
+        <a:font script="Syre" typeface="Estrangelo Edessa"/>
+        <a:font script="Sora" typeface="Nirmala UI"/>
+        <a:font script="Tale" typeface="Microsoft Tai Le"/>
+        <a:font script="Talu" typeface="Microsoft New Tai Lue"/>
+        <a:font script="Tfng" typeface="Ebrima"/>
+      </a:majorFont>
+      <a:minorFont>
+        <a:latin typeface="Aptos" panose="02110004020202020204"/>
+        <a:ea typeface=""/>
+        <a:cs typeface=""/>
+        <a:font script="Jpan" typeface="游ゴシック"/>
+        <a:font script="Hang" typeface="맑은 고딕"/>
+        <a:font script="Hans" typeface="等线"/>
+        <a:font script="Hant" typeface="新細明體"/>
+        <a:font script="Arab" typeface="Arial"/>
+        <a:font script="Hebr" typeface="Arial"/>
+        <a:font script="Thai" typeface="Cordia New"/>
+        <a:font script="Ethi" typeface="Nyala"/>
+        <a:font script="Beng" typeface="Vrinda"/>
+        <a:font script="Gujr" typeface="Shruti"/>
+        <a:font script="Khmr" typeface="DaunPenh"/>
+        <a:font script="Knda" typeface="Tunga"/>
+        <a:font script="Guru" typeface="Raavi"/>
+        <a:font script="Cans" typeface="Euphemia"/>
+        <a:font script="Cher" typeface="Plantagenet Cherokee"/>
+        <a:font script="Yiii" typeface="Microsoft Yi Baiti"/>
+        <a:font script="Tibt" typeface="Microsoft Himalaya"/>
+        <a:font script="Thaa" typeface="MV Boli"/>
+        <a:font script="Deva" typeface="Mangal"/>
+        <a:font script="Telu" typeface="Gautami"/>
+        <a:font script="Taml" typeface="Latha"/>
+        <a:font script="Syrc" typeface="Estrangelo Edessa"/>
+        <a:font script="Orya" typeface="Kalinga"/>
+        <a:font script="Mlym" typeface="Kartika"/>
+        <a:font script="Laoo" typeface="DokChampa"/>
+        <a:font script="Sinh" typeface="Iskoola Pota"/>
+        <a:font script="Mong" typeface="Mongolian Baiti"/>
+        <a:font script="Viet" typeface="Arial"/>
+        <a:font script="Uigh" typeface="Microsoft Uighur"/>
+        <a:font script="Geor" typeface="Sylfaen"/>
+        <a:font script="Armn" typeface="Arial"/>
+        <a:font script="Bugi" typeface="Leelawadee UI"/>
+        <a:font script="Bopo" typeface="Microsoft JhengHei"/>
+        <a:font script="Java" typeface="Javanese Text"/>
+        <a:font script="Lisu" typeface="Segoe UI"/>
+        <a:font script="Mymr" typeface="Myanmar Text"/>
+        <a:font script="Nkoo" typeface="Ebrima"/>
+        <a:font script="Olck" typeface="Nirmala UI"/>
+        <a:font script="Osma" typeface="Ebrima"/>
+        <a:font script="Phag" typeface="Phagspa"/>
+        <a:font script="Syrn" typeface="Estrangelo Edessa"/>
+        <a:font script="Syrj" typeface="Estrangelo Edessa"/>
+        <a:font script="Syre" typeface="Estrangelo Edessa"/>
+        <a:font script="Sora" typeface="Nirmala UI"/>
+        <a:font script="Tale" typeface="Microsoft Tai Le"/>
+        <a:font script="Talu" typeface="Microsoft New Tai Lue"/>
+        <a:font script="Tfng" typeface="Ebrima"/>
+      </a:minorFont>
+    </a:fontScheme>
+    <a:fmtScheme name="Office">
+      <a:fillStyleLst>
+        <a:solidFill>
+          <a:schemeClr val="phClr"/>
+        </a:solidFill>
+        <a:gradFill rotWithShape="1">
+          <a:gsLst>
+            <a:gs pos="0">
+              <a:schemeClr val="phClr">
+                <a:lumMod val="110000"/>
+                <a:satMod val="105000"/>
+                <a:tint val="67000"/>
+              </a:schemeClr>
+            </a:gs>
+            <a:gs pos="50000">
+              <a:schemeClr val="phClr">
+                <a:lumMod val="105000"/>
+                <a:satMod val="103000"/>
+                <a:tint val="73000"/>
+              </a:schemeClr>
+            </a:gs>
+            <a:gs pos="100000">
+              <a:schemeClr val="phClr">
+                <a:lumMod val="105000"/>
+                <a:satMod val="109000"/>
+                <a:tint val="81000"/>
+              </a:schemeClr>
+            </a:gs>
+          </a:gsLst>
+          <a:lin ang="5400000" scaled="0"/>
+        </a:gradFill>
+        <a:gradFill rotWithShape="1">
+          <a:gsLst>
+            <a:gs pos="0">
+              <a:schemeClr val="phClr">
+                <a:satMod val="103000"/>
+                <a:lumMod val="102000"/>
+                <a:tint val="94000"/>
+              </a:schemeClr>
+            </a:gs>
+            <a:gs pos="50000">
+              <a:schemeClr val="phClr">
+                <a:satMod val="110000"/>
+                <a:lumMod val="100000"/>
+                <a:shade val="100000"/>
+              </a:schemeClr>
+            </a:gs>
+            <a:gs pos="100000">
+              <a:schemeClr val="phClr">
+                <a:lumMod val="99000"/>
+                <a:satMod val="120000"/>
+                <a:shade val="78000"/>
+              </a:schemeClr>
+            </a:gs>
+          </a:gsLst>
+          <a:lin ang="5400000" scaled="0"/>
+        </a:gradFill>
+      </a:fillStyleLst>
+      <a:lnStyleLst>
+        <a:ln w="12700" cap="flat" cmpd="sng" algn="ctr">
+          <a:solidFill>
+            <a:schemeClr val="phClr"/>
+          </a:solidFill>
+          <a:prstDash val="solid"/>
+          <a:miter lim="800000"/>
+        </a:ln>
+        <a:ln w="19050" cap="flat" cmpd="sng" algn="ctr">
+          <a:solidFill>
+            <a:schemeClr val="phClr"/>
+          </a:solidFill>
+          <a:prstDash val="solid"/>
+          <a:miter lim="800000"/>
+        </a:ln>
+        <a:ln w="25400" cap="flat" cmpd="sng" algn="ctr">
+          <a:solidFill>
+            <a:schemeClr val="phClr"/>
+          </a:solidFill>
+          <a:prstDash val="solid"/>
+          <a:miter lim="800000"/>
+        </a:ln>
+      </a:lnStyleLst>
+      <a:effectStyleLst>
+        <a:effectStyle>
+          <a:effectLst/>
+        </a:effectStyle>
+        <a:effectStyle>
+          <a:effectLst/>
+        </a:effectStyle>
+        <a:effectStyle>
+          <a:effectLst>
+            <a:outerShdw blurRad="57150" dist="19050" dir="5400000" algn="ctr" rotWithShape="0">
+              <a:srgbClr val="000000">
+                <a:alpha val="63000"/>
+              </a:srgbClr>
+            </a:outerShdw>
+          </a:effectLst>
+        </a:effectStyle>
+      </a:effectStyleLst>
+      <a:bgFillStyleLst>
+        <a:solidFill>
+          <a:schemeClr val="phClr"/>
+        </a:solidFill>
+        <a:solidFill>
+          <a:schemeClr val="phClr">
+            <a:tint val="95000"/>
+            <a:satMod val="170000"/>
+          </a:schemeClr>
+        </a:solidFill>
+        <a:gradFill rotWithShape="1">
+          <a:gsLst>
+            <a:gs pos="0">
+              <a:schemeClr val="phClr">
+                <a:tint val="93000"/>
+                <a:satMod val="150000"/>
+                <a:shade val="98000"/>
+                <a:lumMod val="102000"/>
+              </a:schemeClr>
+            </a:gs>
+            <a:gs pos="50000">
+              <a:schemeClr val="phClr">
+                <a:tint val="98000"/>
+                <a:satMod val="130000"/>
+                <a:shade val="90000"/>
+                <a:lumMod val="103000"/>
+              </a:schemeClr>
+            </a:gs>
+            <a:gs pos="100000">
+              <a:schemeClr val="phClr">
+                <a:shade val="63000"/>
+                <a:satMod val="120000"/>
+              </a:schemeClr>
+            </a:gs>
+          </a:gsLst>
+          <a:lin ang="5400000" scaled="0"/>
+        </a:gradFill>
+      </a:bgFillStyleLst>
+    </a:fmtScheme>
+  </a:themeElements>
+  <a:objectDefaults>
+    <a:lnDef>
+      <a:spPr/>
+      <a:bodyPr/>
+      <a:lstStyle/>
+      <a:style>
+        <a:lnRef idx="2">
+          <a:schemeClr val="accent1"/>
+        </a:lnRef>
+        <a:fillRef idx="0">
+          <a:schemeClr val="accent1"/>
+        </a:fillRef>
+        <a:effectRef idx="1">
+          <a:schemeClr val="accent1"/>
+        </a:effectRef>
+        <a:fontRef idx="minor">
+          <a:schemeClr val="tx1"/>
+        </a:fontRef>
+      </a:style>
+    </a:lnDef>
+  </a:objectDefaults>
+  <a:extraClrSchemeLst/>
+  <a:extLst>
+    <a:ext uri="{05A4C25C-085E-4340-85A3-A5531E510DB2}">
+      <thm15:themeFamily xmlns:thm15="http://schemas.microsoft.com/office/thememl/2012/main" name="Office Theme" id="{2E142A2C-CD16-42D6-873A-C26D2A0506FA}" vid="{1BDDFF52-6CD6-40A5-AB3C-68EB2F1E4D0A}"/>
+    </a:ext>
+  </a:extLst>
+</a:theme>
 </file>
</xml_diff>